<commit_message>
Updated the Oplevering2 Powerpoint and added the Notule in preperation for the Oplevering
</commit_message>
<xml_diff>
--- a/Docs/Oplevering 2/CGI Oplevering2.pptx
+++ b/Docs/Oplevering 2/CGI Oplevering2.pptx
@@ -1307,7 +1307,120 @@
           <a:bodyPr/>
           <a:lstStyle/>
           <a:p>
-            <a:endParaRPr lang="nl-NL" dirty="0"/>
+            <a:r>
+              <a:rPr lang="nl-NL" dirty="0"/>
+              <a:t>Per vervoerstype een bepaalde uitstoot in gram per kilometer</a:t>
+            </a:r>
+          </a:p>
+        </p:txBody>
+      </p:sp>
+      <p:sp>
+        <p:nvSpPr>
+          <p:cNvPr id="4" name="Slide Number Placeholder 3"/>
+          <p:cNvSpPr>
+            <a:spLocks noGrp="1"/>
+          </p:cNvSpPr>
+          <p:nvPr>
+            <p:ph type="sldNum" sz="quarter" idx="5"/>
+          </p:nvPr>
+        </p:nvSpPr>
+        <p:spPr/>
+        <p:txBody>
+          <a:bodyPr/>
+          <a:lstStyle/>
+          <a:p>
+            <a:fld id="{A9D0150D-558D-4046-9558-3094E53A3764}" type="slidenum">
+              <a:rPr lang="nl-NL" smtClean="0"/>
+              <a:t>6</a:t>
+            </a:fld>
+            <a:endParaRPr lang="nl-NL"/>
+          </a:p>
+        </p:txBody>
+      </p:sp>
+    </p:spTree>
+    <p:extLst>
+      <p:ext uri="{BB962C8B-B14F-4D97-AF65-F5344CB8AC3E}">
+        <p14:creationId xmlns:p14="http://schemas.microsoft.com/office/powerpoint/2010/main" val="1170949331"/>
+      </p:ext>
+    </p:extLst>
+  </p:cSld>
+  <p:clrMapOvr>
+    <a:masterClrMapping/>
+  </p:clrMapOvr>
+</p:notes>
+</file>
+
+<file path=ppt/notesSlides/notesSlide7.xml><?xml version="1.0" encoding="utf-8"?>
+<p:notes xmlns:a="http://schemas.openxmlformats.org/drawingml/2006/main" xmlns:r="http://schemas.openxmlformats.org/officeDocument/2006/relationships" xmlns:p="http://schemas.openxmlformats.org/presentationml/2006/main">
+  <p:cSld>
+    <p:spTree>
+      <p:nvGrpSpPr>
+        <p:cNvPr id="1" name=""/>
+        <p:cNvGrpSpPr/>
+        <p:nvPr/>
+      </p:nvGrpSpPr>
+      <p:grpSpPr>
+        <a:xfrm>
+          <a:off x="0" y="0"/>
+          <a:ext cx="0" cy="0"/>
+          <a:chOff x="0" y="0"/>
+          <a:chExt cx="0" cy="0"/>
+        </a:xfrm>
+      </p:grpSpPr>
+      <p:sp>
+        <p:nvSpPr>
+          <p:cNvPr id="2" name="Slide Image Placeholder 1"/>
+          <p:cNvSpPr>
+            <a:spLocks noGrp="1" noRot="1" noChangeAspect="1"/>
+          </p:cNvSpPr>
+          <p:nvPr>
+            <p:ph type="sldImg"/>
+          </p:nvPr>
+        </p:nvSpPr>
+        <p:spPr/>
+      </p:sp>
+      <p:sp>
+        <p:nvSpPr>
+          <p:cNvPr id="3" name="Notes Placeholder 2"/>
+          <p:cNvSpPr>
+            <a:spLocks noGrp="1"/>
+          </p:cNvSpPr>
+          <p:nvPr>
+            <p:ph type="body" idx="1"/>
+          </p:nvPr>
+        </p:nvSpPr>
+        <p:spPr/>
+        <p:txBody>
+          <a:bodyPr/>
+          <a:lstStyle/>
+          <a:p>
+            <a:r>
+              <a:rPr lang="nl-NL" dirty="0"/>
+              <a:t>Klik op het plaatje om naar de site te gaan. </a:t>
+            </a:r>
+            <a:br>
+              <a:rPr lang="nl-NL" dirty="0"/>
+            </a:br>
+            <a:r>
+              <a:rPr lang="nl-NL" dirty="0"/>
+              <a:t>Vooral </a:t>
+            </a:r>
+            <a:r>
+              <a:rPr lang="nl-NL" dirty="0" err="1"/>
+              <a:t>stijn</a:t>
+            </a:r>
+            <a:r>
+              <a:rPr lang="nl-NL" dirty="0"/>
+              <a:t> praat hier over zijn </a:t>
+            </a:r>
+            <a:r>
+              <a:rPr lang="nl-NL" dirty="0" err="1"/>
+              <a:t>Create</a:t>
+            </a:r>
+            <a:r>
+              <a:rPr lang="nl-NL" dirty="0"/>
+              <a:t>, en de rest spreekt over de rest van wat we tot nu toe hebben.</a:t>
+            </a:r>
           </a:p>
         </p:txBody>
       </p:sp>
@@ -1338,6 +1451,121 @@
     <p:extLst>
       <p:ext uri="{BB962C8B-B14F-4D97-AF65-F5344CB8AC3E}">
         <p14:creationId xmlns:p14="http://schemas.microsoft.com/office/powerpoint/2010/main" val="3846709180"/>
+      </p:ext>
+    </p:extLst>
+  </p:cSld>
+  <p:clrMapOvr>
+    <a:masterClrMapping/>
+  </p:clrMapOvr>
+</p:notes>
+</file>
+
+<file path=ppt/notesSlides/notesSlide8.xml><?xml version="1.0" encoding="utf-8"?>
+<p:notes xmlns:a="http://schemas.openxmlformats.org/drawingml/2006/main" xmlns:r="http://schemas.openxmlformats.org/officeDocument/2006/relationships" xmlns:p="http://schemas.openxmlformats.org/presentationml/2006/main">
+  <p:cSld>
+    <p:spTree>
+      <p:nvGrpSpPr>
+        <p:cNvPr id="1" name=""/>
+        <p:cNvGrpSpPr/>
+        <p:nvPr/>
+      </p:nvGrpSpPr>
+      <p:grpSpPr>
+        <a:xfrm>
+          <a:off x="0" y="0"/>
+          <a:ext cx="0" cy="0"/>
+          <a:chOff x="0" y="0"/>
+          <a:chExt cx="0" cy="0"/>
+        </a:xfrm>
+      </p:grpSpPr>
+      <p:sp>
+        <p:nvSpPr>
+          <p:cNvPr id="2" name="Slide Image Placeholder 1"/>
+          <p:cNvSpPr>
+            <a:spLocks noGrp="1" noRot="1" noChangeAspect="1"/>
+          </p:cNvSpPr>
+          <p:nvPr>
+            <p:ph type="sldImg"/>
+          </p:nvPr>
+        </p:nvSpPr>
+        <p:spPr/>
+      </p:sp>
+      <p:sp>
+        <p:nvSpPr>
+          <p:cNvPr id="3" name="Notes Placeholder 2"/>
+          <p:cNvSpPr>
+            <a:spLocks noGrp="1"/>
+          </p:cNvSpPr>
+          <p:nvPr>
+            <p:ph type="body" idx="1"/>
+          </p:nvPr>
+        </p:nvSpPr>
+        <p:spPr/>
+        <p:txBody>
+          <a:bodyPr/>
+          <a:lstStyle/>
+          <a:p>
+            <a:r>
+              <a:rPr lang="nl-NL" dirty="0"/>
+              <a:t>Vragen die wij hebben:</a:t>
+            </a:r>
+          </a:p>
+          <a:p>
+            <a:pPr marL="171450" indent="-171450">
+              <a:buFontTx/>
+              <a:buChar char="-"/>
+            </a:pPr>
+            <a:r>
+              <a:rPr lang="nl-NL" dirty="0"/>
+              <a:t>Algemene feedback op alles wat we hebben gezien</a:t>
+            </a:r>
+          </a:p>
+          <a:p>
+            <a:pPr marL="171450" indent="-171450">
+              <a:buFontTx/>
+              <a:buChar char="-"/>
+            </a:pPr>
+            <a:r>
+              <a:rPr lang="nl-NL" dirty="0"/>
+              <a:t>Of ze de presentatie </a:t>
+            </a:r>
+            <a:r>
+              <a:rPr lang="nl-NL" dirty="0" err="1"/>
+              <a:t>style</a:t>
+            </a:r>
+            <a:r>
+              <a:rPr lang="nl-NL" dirty="0"/>
+              <a:t> fijn vonden en wat wij eventueel kunnen verbeteren.</a:t>
+            </a:r>
+          </a:p>
+        </p:txBody>
+      </p:sp>
+      <p:sp>
+        <p:nvSpPr>
+          <p:cNvPr id="4" name="Slide Number Placeholder 3"/>
+          <p:cNvSpPr>
+            <a:spLocks noGrp="1"/>
+          </p:cNvSpPr>
+          <p:nvPr>
+            <p:ph type="sldNum" sz="quarter" idx="5"/>
+          </p:nvPr>
+        </p:nvSpPr>
+        <p:spPr/>
+        <p:txBody>
+          <a:bodyPr/>
+          <a:lstStyle/>
+          <a:p>
+            <a:fld id="{A9D0150D-558D-4046-9558-3094E53A3764}" type="slidenum">
+              <a:rPr lang="nl-NL" smtClean="0"/>
+              <a:t>8</a:t>
+            </a:fld>
+            <a:endParaRPr lang="nl-NL"/>
+          </a:p>
+        </p:txBody>
+      </p:sp>
+    </p:spTree>
+    <p:extLst>
+      <p:ext uri="{BB962C8B-B14F-4D97-AF65-F5344CB8AC3E}">
+        <p14:creationId xmlns:p14="http://schemas.microsoft.com/office/powerpoint/2010/main" val="3384265755"/>
       </p:ext>
     </p:extLst>
   </p:cSld>
@@ -20466,13 +20694,7 @@
                             <a:rPr lang="nl-NL" sz="1800" b="0" i="1" smtClean="0">
                               <a:latin typeface="Cambria Math" panose="02040503050406030204" pitchFamily="18" charset="0"/>
                             </a:rPr>
-                            <m:t>𝑥𝑚𝑎</m:t>
-                          </m:r>
-                          <m:r>
-                            <a:rPr lang="nl-NL" sz="1800" b="0" i="1" baseline="-25000" smtClean="0">
-                              <a:latin typeface="Cambria Math" panose="02040503050406030204" pitchFamily="18" charset="0"/>
-                            </a:rPr>
-                            <m:t>𝑥</m:t>
+                            <m:t>𝑥𝑚𝑎𝑥</m:t>
                           </m:r>
                         </m:den>
                       </m:f>
@@ -21009,7 +21231,7 @@
           <p:nvPr/>
         </p:nvPicPr>
         <p:blipFill>
-          <a:blip r:embed="rId2"/>
+          <a:blip r:embed="rId3"/>
           <a:stretch>
             <a:fillRect/>
           </a:stretch>
@@ -21287,7 +21509,7 @@
           <p:nvPr/>
         </p:nvPicPr>
         <p:blipFill rotWithShape="1">
-          <a:blip r:embed="rId2"/>
+          <a:blip r:embed="rId3"/>
           <a:srcRect t="5493" b="4145"/>
           <a:stretch/>
         </p:blipFill>
@@ -21360,7 +21582,34 @@
                   <a:schemeClr val="bg1"/>
                 </a:solidFill>
               </a:rPr>
-              <a:t>Feedback?</a:t>
+              <a:t>Feedback op Inhoud?</a:t>
+            </a:r>
+          </a:p>
+          <a:p>
+            <a:r>
+              <a:rPr lang="nl-NL" dirty="0">
+                <a:solidFill>
+                  <a:schemeClr val="bg1"/>
+                </a:solidFill>
+              </a:rPr>
+              <a:t>Feedback op Presentatie?</a:t>
+            </a:r>
+          </a:p>
+          <a:p>
+            <a:endParaRPr lang="nl-NL" dirty="0">
+              <a:solidFill>
+                <a:schemeClr val="bg1"/>
+              </a:solidFill>
+            </a:endParaRPr>
+          </a:p>
+          <a:p>
+            <a:r>
+              <a:rPr lang="nl-NL" dirty="0">
+                <a:solidFill>
+                  <a:schemeClr val="bg1"/>
+                </a:solidFill>
+              </a:rPr>
+              <a:t>Jullie vragen aan ons?</a:t>
             </a:r>
           </a:p>
         </p:txBody>
@@ -21887,15 +22136,6 @@
 </file>
 
 <file path=customXml/item1.xml><?xml version="1.0" encoding="utf-8"?>
-<?mso-contentType ?>
-<FormTemplates xmlns="http://schemas.microsoft.com/sharepoint/v3/contenttype/forms">
-  <Display>DocumentLibraryForm</Display>
-  <Edit>DocumentLibraryForm</Edit>
-  <New>DocumentLibraryForm</New>
-</FormTemplates>
-</file>
-
-<file path=customXml/item2.xml><?xml version="1.0" encoding="utf-8"?>
 <ct:contentTypeSchema xmlns:ct="http://schemas.microsoft.com/office/2006/metadata/contentType" xmlns:ma="http://schemas.microsoft.com/office/2006/metadata/properties/metaAttributes" ct:_="" ma:_="" ma:contentTypeName="Document" ma:contentTypeID="0x010100986A798928749C45AF93A7695FD726CA" ma:contentTypeVersion="10" ma:contentTypeDescription="Een nieuw document maken." ma:contentTypeScope="" ma:versionID="cba784012c98f4bb3e9ad358de16c100">
   <xsd:schema xmlns:xsd="http://www.w3.org/2001/XMLSchema" xmlns:xs="http://www.w3.org/2001/XMLSchema" xmlns:p="http://schemas.microsoft.com/office/2006/metadata/properties" xmlns:ns3="a9c2ce52-029c-4043-a58b-a7c3ce360dc2" xmlns:ns4="86bd6a70-24e9-4c7e-b337-bc1894d11167" targetNamespace="http://schemas.microsoft.com/office/2006/metadata/properties" ma:root="true" ma:fieldsID="7b4376fcf1816dceb0361a9ea12d9381" ns3:_="" ns4:_="">
     <xsd:import namespace="a9c2ce52-029c-4043-a58b-a7c3ce360dc2"/>
@@ -22098,6 +22338,15 @@
 </ct:contentTypeSchema>
 </file>
 
+<file path=customXml/item2.xml><?xml version="1.0" encoding="utf-8"?>
+<?mso-contentType ?>
+<FormTemplates xmlns="http://schemas.microsoft.com/sharepoint/v3/contenttype/forms">
+  <Display>DocumentLibraryForm</Display>
+  <Edit>DocumentLibraryForm</Edit>
+  <New>DocumentLibraryForm</New>
+</FormTemplates>
+</file>
+
 <file path=customXml/item3.xml><?xml version="1.0" encoding="utf-8"?>
 <p:properties xmlns:p="http://schemas.microsoft.com/office/2006/metadata/properties" xmlns:xsi="http://www.w3.org/2001/XMLSchema-instance" xmlns:pc="http://schemas.microsoft.com/office/infopath/2007/PartnerControls">
   <documentManagement/>
@@ -22105,14 +22354,6 @@
 </file>
 
 <file path=customXml/itemProps1.xml><?xml version="1.0" encoding="utf-8"?>
-<ds:datastoreItem xmlns:ds="http://schemas.openxmlformats.org/officeDocument/2006/customXml" ds:itemID="{B40D6525-3551-4E8E-93B0-419EA935138E}">
-  <ds:schemaRefs>
-    <ds:schemaRef ds:uri="http://schemas.microsoft.com/sharepoint/v3/contenttype/forms"/>
-  </ds:schemaRefs>
-</ds:datastoreItem>
-</file>
-
-<file path=customXml/itemProps2.xml><?xml version="1.0" encoding="utf-8"?>
 <ds:datastoreItem xmlns:ds="http://schemas.openxmlformats.org/officeDocument/2006/customXml" ds:itemID="{36440C25-9E1B-4047-A3BC-D34794A3062D}">
   <ds:schemaRefs>
     <ds:schemaRef ds:uri="http://schemas.microsoft.com/office/2006/metadata/contentType"/>
@@ -22127,6 +22368,14 @@
     <ds:schemaRef ds:uri="http://purl.org/dc/elements/1.1/"/>
     <ds:schemaRef ds:uri="http://purl.org/dc/terms/"/>
     <ds:schemaRef ds:uri="http://schemas.microsoft.com/internal/obd"/>
+  </ds:schemaRefs>
+</ds:datastoreItem>
+</file>
+
+<file path=customXml/itemProps2.xml><?xml version="1.0" encoding="utf-8"?>
+<ds:datastoreItem xmlns:ds="http://schemas.openxmlformats.org/officeDocument/2006/customXml" ds:itemID="{B40D6525-3551-4E8E-93B0-419EA935138E}">
+  <ds:schemaRefs>
+    <ds:schemaRef ds:uri="http://schemas.microsoft.com/sharepoint/v3/contenttype/forms"/>
   </ds:schemaRefs>
 </ds:datastoreItem>
 </file>

</xml_diff>

<commit_message>
SQL in Homecontroller and Powerpoint Oplevering2 changed
</commit_message>
<xml_diff>
--- a/Docs/Oplevering 2/CGI Oplevering2.pptx
+++ b/Docs/Oplevering 2/CGI Oplevering2.pptx
@@ -256,7 +256,7 @@
           <a:p>
             <a:fld id="{D8FBA7F6-17E7-4726-9EA4-F727C7A2FBCE}" type="datetimeFigureOut">
               <a:rPr lang="nl-NL" smtClean="0"/>
-              <a:t>3-4-2023</a:t>
+              <a:t>4-4-2023</a:t>
             </a:fld>
             <a:endParaRPr lang="nl-NL"/>
           </a:p>
@@ -3241,7 +3241,7 @@
           <a:p>
             <a:fld id="{8F72BA41-EC5B-4197-BCC8-0FD2E523CD7A}" type="datetimeFigureOut">
               <a:rPr lang="en-US" smtClean="0"/>
-              <a:t>4/3/2023</a:t>
+              <a:t>4/4/2023</a:t>
             </a:fld>
             <a:endParaRPr lang="en-US"/>
           </a:p>
@@ -3444,7 +3444,7 @@
           <a:p>
             <a:fld id="{8F72BA41-EC5B-4197-BCC8-0FD2E523CD7A}" type="datetimeFigureOut">
               <a:rPr lang="en-US" smtClean="0"/>
-              <a:t>4/3/2023</a:t>
+              <a:t>4/4/2023</a:t>
             </a:fld>
             <a:endParaRPr lang="en-US"/>
           </a:p>
@@ -5165,7 +5165,7 @@
           <a:p>
             <a:fld id="{8F72BA41-EC5B-4197-BCC8-0FD2E523CD7A}" type="datetimeFigureOut">
               <a:rPr lang="en-US" smtClean="0"/>
-              <a:t>4/3/2023</a:t>
+              <a:t>4/4/2023</a:t>
             </a:fld>
             <a:endParaRPr lang="en-US"/>
           </a:p>
@@ -5364,7 +5364,7 @@
           <a:p>
             <a:fld id="{8F72BA41-EC5B-4197-BCC8-0FD2E523CD7A}" type="datetimeFigureOut">
               <a:rPr lang="en-US" smtClean="0"/>
-              <a:t>4/3/2023</a:t>
+              <a:t>4/4/2023</a:t>
             </a:fld>
             <a:endParaRPr lang="en-US"/>
           </a:p>
@@ -7154,7 +7154,7 @@
           <a:p>
             <a:fld id="{8F72BA41-EC5B-4197-BCC8-0FD2E523CD7A}" type="datetimeFigureOut">
               <a:rPr lang="en-US" smtClean="0"/>
-              <a:t>4/3/2023</a:t>
+              <a:t>4/4/2023</a:t>
             </a:fld>
             <a:endParaRPr lang="en-US"/>
           </a:p>
@@ -7427,7 +7427,7 @@
           <a:p>
             <a:fld id="{8F72BA41-EC5B-4197-BCC8-0FD2E523CD7A}" type="datetimeFigureOut">
               <a:rPr lang="en-US" smtClean="0"/>
-              <a:t>4/3/2023</a:t>
+              <a:t>4/4/2023</a:t>
             </a:fld>
             <a:endParaRPr lang="en-US"/>
           </a:p>
@@ -7847,7 +7847,7 @@
           <a:p>
             <a:fld id="{8F72BA41-EC5B-4197-BCC8-0FD2E523CD7A}" type="datetimeFigureOut">
               <a:rPr lang="en-US" smtClean="0"/>
-              <a:t>4/3/2023</a:t>
+              <a:t>4/4/2023</a:t>
             </a:fld>
             <a:endParaRPr lang="en-US"/>
           </a:p>
@@ -8003,7 +8003,7 @@
           <a:p>
             <a:fld id="{8F72BA41-EC5B-4197-BCC8-0FD2E523CD7A}" type="datetimeFigureOut">
               <a:rPr lang="en-US" smtClean="0"/>
-              <a:t>4/3/2023</a:t>
+              <a:t>4/4/2023</a:t>
             </a:fld>
             <a:endParaRPr lang="en-US"/>
           </a:p>
@@ -9571,7 +9571,7 @@
           <a:p>
             <a:fld id="{8F72BA41-EC5B-4197-BCC8-0FD2E523CD7A}" type="datetimeFigureOut">
               <a:rPr lang="en-US" smtClean="0"/>
-              <a:t>4/3/2023</a:t>
+              <a:t>4/4/2023</a:t>
             </a:fld>
             <a:endParaRPr lang="en-US"/>
           </a:p>
@@ -11422,7 +11422,7 @@
           <a:p>
             <a:fld id="{8F72BA41-EC5B-4197-BCC8-0FD2E523CD7A}" type="datetimeFigureOut">
               <a:rPr lang="en-US" smtClean="0"/>
-              <a:t>4/3/2023</a:t>
+              <a:t>4/4/2023</a:t>
             </a:fld>
             <a:endParaRPr lang="en-US"/>
           </a:p>
@@ -13235,7 +13235,7 @@
           <a:p>
             <a:fld id="{8F72BA41-EC5B-4197-BCC8-0FD2E523CD7A}" type="datetimeFigureOut">
               <a:rPr lang="en-US" smtClean="0"/>
-              <a:t>4/3/2023</a:t>
+              <a:t>4/4/2023</a:t>
             </a:fld>
             <a:endParaRPr lang="en-US"/>
           </a:p>
@@ -14929,7 +14929,7 @@
             <a:fld id="{8F72BA41-EC5B-4197-BCC8-0FD2E523CD7A}" type="datetimeFigureOut">
               <a:rPr lang="en-US" smtClean="0"/>
               <a:pPr/>
-              <a:t>4/3/2023</a:t>
+              <a:t>4/4/2023</a:t>
             </a:fld>
             <a:endParaRPr lang="en-US" dirty="0"/>
           </a:p>
@@ -17396,10 +17396,10 @@
       </p:sp>
       <p:pic>
         <p:nvPicPr>
-          <p:cNvPr id="4" name="Picture 3">
+          <p:cNvPr id="5" name="Picture 4">
             <a:extLst>
               <a:ext uri="{FF2B5EF4-FFF2-40B4-BE49-F238E27FC236}">
-                <a16:creationId xmlns:a16="http://schemas.microsoft.com/office/drawing/2014/main" id="{D64424B1-96A4-6AC9-76CA-577051712DAA}"/>
+                <a16:creationId xmlns:a16="http://schemas.microsoft.com/office/drawing/2014/main" id="{1FE51007-E01E-DD16-8B14-2FDB6B47B779}"/>
               </a:ext>
             </a:extLst>
           </p:cNvPr>
@@ -17410,51 +17410,19 @@
         </p:nvPicPr>
         <p:blipFill rotWithShape="1">
           <a:blip r:embed="rId3">
-            <a:alphaModFix amt="60000"/>
+            <a:alphaModFix amt="70000"/>
           </a:blip>
-          <a:srcRect t="1348" r="-1" b="-1"/>
+          <a:srcRect t="5493" b="4145"/>
           <a:stretch/>
         </p:blipFill>
         <p:spPr>
           <a:xfrm>
-            <a:off x="-18954" y="10"/>
-            <a:ext cx="11167367" cy="6857990"/>
+            <a:off x="-5788576" y="-289539"/>
+            <a:ext cx="19012207" cy="10694367"/>
           </a:xfrm>
-          <a:custGeom>
+          <a:prstGeom prst="rect">
             <a:avLst/>
-            <a:gdLst/>
-            <a:ahLst/>
-            <a:cxnLst/>
-            <a:rect l="l" t="t" r="r" b="b"/>
-            <a:pathLst>
-              <a:path w="12142767" h="6858000">
-                <a:moveTo>
-                  <a:pt x="0" y="0"/>
-                </a:moveTo>
-                <a:lnTo>
-                  <a:pt x="11251490" y="0"/>
-                </a:lnTo>
-                <a:lnTo>
-                  <a:pt x="11255634" y="308191"/>
-                </a:lnTo>
-                <a:cubicBezTo>
-                  <a:pt x="11341049" y="3428907"/>
-                  <a:pt x="12695043" y="3532715"/>
-                  <a:pt x="11886084" y="6854559"/>
-                </a:cubicBezTo>
-                <a:lnTo>
-                  <a:pt x="7539784" y="6854559"/>
-                </a:lnTo>
-                <a:lnTo>
-                  <a:pt x="7539784" y="6858000"/>
-                </a:lnTo>
-                <a:lnTo>
-                  <a:pt x="0" y="6858000"/>
-                </a:lnTo>
-                <a:close/>
-              </a:path>
-            </a:pathLst>
-          </a:custGeom>
+          </a:prstGeom>
         </p:spPr>
       </p:pic>
       <p:sp>
@@ -17867,8 +17835,8 @@
         </p:blipFill>
         <p:spPr>
           <a:xfrm>
-            <a:off x="20" y="10"/>
-            <a:ext cx="12191980" cy="6857989"/>
+            <a:off x="-505980" y="-2004409"/>
+            <a:ext cx="16216920" cy="9122018"/>
           </a:xfrm>
           <a:prstGeom prst="rect">
             <a:avLst/>
@@ -19936,7 +19904,7 @@
         </p:blipFill>
         <p:spPr>
           <a:xfrm>
-            <a:off x="-2751013" y="-1547446"/>
+            <a:off x="-365760" y="-365760"/>
             <a:ext cx="17923281" cy="10081846"/>
           </a:xfrm>
           <a:prstGeom prst="rect">
@@ -19991,7 +19959,7 @@
               <p:nvPr>
                 <p:extLst>
                   <p:ext uri="{D42A27DB-BD31-4B8C-83A1-F6EECF244321}">
-                    <p14:modId xmlns:p14="http://schemas.microsoft.com/office/powerpoint/2010/main" val="1022949963"/>
+                    <p14:modId xmlns:p14="http://schemas.microsoft.com/office/powerpoint/2010/main" val="1928164765"/>
                   </p:ext>
                 </p:extLst>
               </p:nvPr>
@@ -20051,7 +20019,7 @@
                       </p166:spPr>
                     </psuz:zmPr>
                   </psuz:summaryZmObj>
-                  <psuz:summaryZmObj sectionId="{A8EEEB42-2A44-4AE8-A4C8-57BEB5F648EA}" offsetFactorX="45472" offsetFactorY="5796" scaleFactorX="79205" scaleFactorY="79205">
+                  <psuz:summaryZmObj sectionId="{A8EEEB42-2A44-4AE8-A4C8-57BEB5F648EA}" offsetFactorX="45472" offsetFactorY="5796" scaleFactorX="80928" scaleFactorY="80928">
                     <psuz:zmPr id="{5FA8CD0D-CBAF-468D-90C4-452DDBC28EFA}" transitionDur="1000">
                       <p166:blipFill xmlns:p166="http://schemas.microsoft.com/office/powerpoint/2016/6/main">
                         <a:blip r:embed="rId6"/>
@@ -20060,9 +20028,9 @@
                         </a:stretch>
                       </p166:blipFill>
                       <p166:spPr xmlns:p166="http://schemas.microsoft.com/office/powerpoint/2016/6/main">
-                        <a:xfrm rot="10800000" flipH="1" flipV="1">
-                          <a:off x="3669177" y="3876326"/>
-                          <a:ext cx="4178120" cy="2350192"/>
+                        <a:xfrm>
+                          <a:off x="3623733" y="3850764"/>
+                          <a:ext cx="4269008" cy="2401316"/>
                         </a:xfrm>
                         <a:prstGeom prst="rect">
                           <a:avLst/>
@@ -20183,9 +20151,9 @@
                 </a:stretch>
               </p:blipFill>
               <p:spPr>
-                <a:xfrm rot="10800000" flipH="1" flipV="1">
-                  <a:off x="3669177" y="4140486"/>
-                  <a:ext cx="4178120" cy="2350192"/>
+                <a:xfrm>
+                  <a:off x="3623733" y="4114924"/>
+                  <a:ext cx="4269008" cy="2401316"/>
                 </a:xfrm>
                 <a:prstGeom prst="rect">
                   <a:avLst/>
@@ -20347,13 +20315,13 @@
   <p:clrMapOvr>
     <a:masterClrMapping/>
   </p:clrMapOvr>
-  <mc:AlternateContent xmlns:mc="http://schemas.openxmlformats.org/markup-compatibility/2006" xmlns:p159="http://schemas.microsoft.com/office/powerpoint/2015/09/main">
-    <mc:Choice Requires="p159">
+  <mc:AlternateContent xmlns:mc="http://schemas.openxmlformats.org/markup-compatibility/2006">
+    <mc:Choice xmlns:p159="http://schemas.microsoft.com/office/powerpoint/2015/09/main" Requires="p159">
       <p:transition xmlns:p14="http://schemas.microsoft.com/office/powerpoint/2010/main" spd="slow" p14:dur="2000">
         <p159:morph option="byWord"/>
       </p:transition>
     </mc:Choice>
-    <mc:Fallback xmlns="">
+    <mc:Fallback>
       <p:transition spd="slow">
         <p:fade/>
       </p:transition>
@@ -20537,6 +20505,18 @@
   <p:clrMapOvr>
     <a:masterClrMapping/>
   </p:clrMapOvr>
+  <mc:AlternateContent xmlns:mc="http://schemas.openxmlformats.org/markup-compatibility/2006">
+    <mc:Choice xmlns:p159="http://schemas.microsoft.com/office/powerpoint/2015/09/main" Requires="p159">
+      <p:transition xmlns:p14="http://schemas.microsoft.com/office/powerpoint/2010/main" spd="slow" p14:dur="2000">
+        <p159:morph option="byChar"/>
+      </p:transition>
+    </mc:Choice>
+    <mc:Fallback>
+      <p:transition spd="slow">
+        <p:fade/>
+      </p:transition>
+    </mc:Fallback>
+  </mc:AlternateContent>
 </p:sld>
 </file>
 
@@ -21141,6 +21121,18 @@
   <p:clrMapOvr>
     <a:masterClrMapping/>
   </p:clrMapOvr>
+  <mc:AlternateContent xmlns:mc="http://schemas.openxmlformats.org/markup-compatibility/2006">
+    <mc:Choice xmlns:p159="http://schemas.microsoft.com/office/powerpoint/2015/09/main" Requires="p159">
+      <p:transition xmlns:p14="http://schemas.microsoft.com/office/powerpoint/2010/main" spd="slow" p14:dur="2000">
+        <p159:morph option="byChar"/>
+      </p:transition>
+    </mc:Choice>
+    <mc:Fallback>
+      <p:transition spd="slow">
+        <p:fade/>
+      </p:transition>
+    </mc:Fallback>
+  </mc:AlternateContent>
 </p:sld>
 </file>
 
@@ -21344,6 +21336,9 @@
   <p:clrMapOvr>
     <a:masterClrMapping/>
   </p:clrMapOvr>
+  <p:transition spd="slow">
+    <p:push dir="u"/>
+  </p:transition>
 </p:sld>
 </file>
 
@@ -21474,6 +21469,18 @@
   <p:clrMapOvr>
     <a:masterClrMapping/>
   </p:clrMapOvr>
+  <mc:AlternateContent xmlns:mc="http://schemas.openxmlformats.org/markup-compatibility/2006">
+    <mc:Choice xmlns:p159="http://schemas.microsoft.com/office/powerpoint/2015/09/main" Requires="p159">
+      <p:transition xmlns:p14="http://schemas.microsoft.com/office/powerpoint/2010/main" spd="slow" p14:dur="2000">
+        <p159:morph option="byChar"/>
+      </p:transition>
+    </mc:Choice>
+    <mc:Fallback>
+      <p:transition spd="slow">
+        <p:fade/>
+      </p:transition>
+    </mc:Fallback>
+  </mc:AlternateContent>
 </p:sld>
 </file>
 
@@ -21515,7 +21522,7 @@
         </p:blipFill>
         <p:spPr>
           <a:xfrm>
-            <a:off x="-1036320" y="-651500"/>
+            <a:off x="-1950720" y="-1087609"/>
             <a:ext cx="14386560" cy="8092440"/>
           </a:xfrm>
           <a:prstGeom prst="rect">
@@ -22136,6 +22143,15 @@
 </file>
 
 <file path=customXml/item1.xml><?xml version="1.0" encoding="utf-8"?>
+<?mso-contentType ?>
+<FormTemplates xmlns="http://schemas.microsoft.com/sharepoint/v3/contenttype/forms">
+  <Display>DocumentLibraryForm</Display>
+  <Edit>DocumentLibraryForm</Edit>
+  <New>DocumentLibraryForm</New>
+</FormTemplates>
+</file>
+
+<file path=customXml/item2.xml><?xml version="1.0" encoding="utf-8"?>
 <ct:contentTypeSchema xmlns:ct="http://schemas.microsoft.com/office/2006/metadata/contentType" xmlns:ma="http://schemas.microsoft.com/office/2006/metadata/properties/metaAttributes" ct:_="" ma:_="" ma:contentTypeName="Document" ma:contentTypeID="0x010100986A798928749C45AF93A7695FD726CA" ma:contentTypeVersion="10" ma:contentTypeDescription="Een nieuw document maken." ma:contentTypeScope="" ma:versionID="cba784012c98f4bb3e9ad358de16c100">
   <xsd:schema xmlns:xsd="http://www.w3.org/2001/XMLSchema" xmlns:xs="http://www.w3.org/2001/XMLSchema" xmlns:p="http://schemas.microsoft.com/office/2006/metadata/properties" xmlns:ns3="a9c2ce52-029c-4043-a58b-a7c3ce360dc2" xmlns:ns4="86bd6a70-24e9-4c7e-b337-bc1894d11167" targetNamespace="http://schemas.microsoft.com/office/2006/metadata/properties" ma:root="true" ma:fieldsID="7b4376fcf1816dceb0361a9ea12d9381" ns3:_="" ns4:_="">
     <xsd:import namespace="a9c2ce52-029c-4043-a58b-a7c3ce360dc2"/>
@@ -22338,15 +22354,6 @@
 </ct:contentTypeSchema>
 </file>
 
-<file path=customXml/item2.xml><?xml version="1.0" encoding="utf-8"?>
-<?mso-contentType ?>
-<FormTemplates xmlns="http://schemas.microsoft.com/sharepoint/v3/contenttype/forms">
-  <Display>DocumentLibraryForm</Display>
-  <Edit>DocumentLibraryForm</Edit>
-  <New>DocumentLibraryForm</New>
-</FormTemplates>
-</file>
-
 <file path=customXml/item3.xml><?xml version="1.0" encoding="utf-8"?>
 <p:properties xmlns:p="http://schemas.microsoft.com/office/2006/metadata/properties" xmlns:xsi="http://www.w3.org/2001/XMLSchema-instance" xmlns:pc="http://schemas.microsoft.com/office/infopath/2007/PartnerControls">
   <documentManagement/>
@@ -22354,6 +22361,14 @@
 </file>
 
 <file path=customXml/itemProps1.xml><?xml version="1.0" encoding="utf-8"?>
+<ds:datastoreItem xmlns:ds="http://schemas.openxmlformats.org/officeDocument/2006/customXml" ds:itemID="{B40D6525-3551-4E8E-93B0-419EA935138E}">
+  <ds:schemaRefs>
+    <ds:schemaRef ds:uri="http://schemas.microsoft.com/sharepoint/v3/contenttype/forms"/>
+  </ds:schemaRefs>
+</ds:datastoreItem>
+</file>
+
+<file path=customXml/itemProps2.xml><?xml version="1.0" encoding="utf-8"?>
 <ds:datastoreItem xmlns:ds="http://schemas.openxmlformats.org/officeDocument/2006/customXml" ds:itemID="{36440C25-9E1B-4047-A3BC-D34794A3062D}">
   <ds:schemaRefs>
     <ds:schemaRef ds:uri="http://schemas.microsoft.com/office/2006/metadata/contentType"/>
@@ -22368,14 +22383,6 @@
     <ds:schemaRef ds:uri="http://purl.org/dc/elements/1.1/"/>
     <ds:schemaRef ds:uri="http://purl.org/dc/terms/"/>
     <ds:schemaRef ds:uri="http://schemas.microsoft.com/internal/obd"/>
-  </ds:schemaRefs>
-</ds:datastoreItem>
-</file>
-
-<file path=customXml/itemProps2.xml><?xml version="1.0" encoding="utf-8"?>
-<ds:datastoreItem xmlns:ds="http://schemas.openxmlformats.org/officeDocument/2006/customXml" ds:itemID="{B40D6525-3551-4E8E-93B0-419EA935138E}">
-  <ds:schemaRefs>
-    <ds:schemaRef ds:uri="http://schemas.microsoft.com/sharepoint/v3/contenttype/forms"/>
   </ds:schemaRefs>
 </ds:datastoreItem>
 </file>

</xml_diff>